<commit_message>
Update the repo with Git hub info
</commit_message>
<xml_diff>
--- a/Class-1/Python For Everyone.pptx
+++ b/Class-1/Python For Everyone.pptx
@@ -10,17 +10,20 @@
     <p:sldId id="258" r:id="rId4"/>
     <p:sldId id="259" r:id="rId5"/>
     <p:sldId id="260" r:id="rId6"/>
-    <p:sldId id="261" r:id="rId7"/>
-    <p:sldId id="262" r:id="rId8"/>
-    <p:sldId id="264" r:id="rId9"/>
-    <p:sldId id="263" r:id="rId10"/>
-    <p:sldId id="265" r:id="rId11"/>
-    <p:sldId id="266" r:id="rId12"/>
-    <p:sldId id="267" r:id="rId13"/>
-    <p:sldId id="268" r:id="rId14"/>
-    <p:sldId id="269" r:id="rId15"/>
-    <p:sldId id="270" r:id="rId16"/>
-    <p:sldId id="271" r:id="rId17"/>
+    <p:sldId id="272" r:id="rId7"/>
+    <p:sldId id="273" r:id="rId8"/>
+    <p:sldId id="274" r:id="rId9"/>
+    <p:sldId id="261" r:id="rId10"/>
+    <p:sldId id="262" r:id="rId11"/>
+    <p:sldId id="264" r:id="rId12"/>
+    <p:sldId id="263" r:id="rId13"/>
+    <p:sldId id="265" r:id="rId14"/>
+    <p:sldId id="266" r:id="rId15"/>
+    <p:sldId id="267" r:id="rId16"/>
+    <p:sldId id="268" r:id="rId17"/>
+    <p:sldId id="269" r:id="rId18"/>
+    <p:sldId id="270" r:id="rId19"/>
+    <p:sldId id="271" r:id="rId20"/>
   </p:sldIdLst>
   <p:sldSz cx="12192000" cy="6858000"/>
   <p:notesSz cx="6858000" cy="9144000"/>
@@ -297,7 +300,7 @@
           <a:p>
             <a:fld id="{3A8AB521-9182-4012-B86B-65B8484C7DE3}" type="datetimeFigureOut">
               <a:rPr lang="en-US" smtClean="0"/>
-              <a:t>1/28/2025</a:t>
+              <a:t>1/29/2025</a:t>
             </a:fld>
             <a:endParaRPr lang="en-US"/>
           </a:p>
@@ -564,7 +567,7 @@
           <a:p>
             <a:fld id="{3A8AB521-9182-4012-B86B-65B8484C7DE3}" type="datetimeFigureOut">
               <a:rPr lang="en-US" smtClean="0"/>
-              <a:t>1/28/2025</a:t>
+              <a:t>1/29/2025</a:t>
             </a:fld>
             <a:endParaRPr lang="en-US"/>
           </a:p>
@@ -795,7 +798,7 @@
           <a:p>
             <a:fld id="{3A8AB521-9182-4012-B86B-65B8484C7DE3}" type="datetimeFigureOut">
               <a:rPr lang="en-US" smtClean="0"/>
-              <a:t>1/28/2025</a:t>
+              <a:t>1/29/2025</a:t>
             </a:fld>
             <a:endParaRPr lang="en-US"/>
           </a:p>
@@ -1105,7 +1108,7 @@
           <a:p>
             <a:fld id="{3A8AB521-9182-4012-B86B-65B8484C7DE3}" type="datetimeFigureOut">
               <a:rPr lang="en-US" smtClean="0"/>
-              <a:t>1/28/2025</a:t>
+              <a:t>1/29/2025</a:t>
             </a:fld>
             <a:endParaRPr lang="en-US"/>
           </a:p>
@@ -1578,7 +1581,7 @@
           <a:p>
             <a:fld id="{3A8AB521-9182-4012-B86B-65B8484C7DE3}" type="datetimeFigureOut">
               <a:rPr lang="en-US" smtClean="0"/>
-              <a:t>1/28/2025</a:t>
+              <a:t>1/29/2025</a:t>
             </a:fld>
             <a:endParaRPr lang="en-US"/>
           </a:p>
@@ -2125,7 +2128,7 @@
           <a:p>
             <a:fld id="{3A8AB521-9182-4012-B86B-65B8484C7DE3}" type="datetimeFigureOut">
               <a:rPr lang="en-US" smtClean="0"/>
-              <a:t>1/28/2025</a:t>
+              <a:t>1/29/2025</a:t>
             </a:fld>
             <a:endParaRPr lang="en-US"/>
           </a:p>
@@ -2899,7 +2902,7 @@
           <a:p>
             <a:fld id="{3A8AB521-9182-4012-B86B-65B8484C7DE3}" type="datetimeFigureOut">
               <a:rPr lang="en-US" smtClean="0"/>
-              <a:t>1/28/2025</a:t>
+              <a:t>1/29/2025</a:t>
             </a:fld>
             <a:endParaRPr lang="en-US"/>
           </a:p>
@@ -3074,7 +3077,7 @@
           <a:p>
             <a:fld id="{3A8AB521-9182-4012-B86B-65B8484C7DE3}" type="datetimeFigureOut">
               <a:rPr lang="en-US" smtClean="0"/>
-              <a:t>1/28/2025</a:t>
+              <a:t>1/29/2025</a:t>
             </a:fld>
             <a:endParaRPr lang="en-US"/>
           </a:p>
@@ -3297,7 +3300,7 @@
           <a:p>
             <a:fld id="{3A8AB521-9182-4012-B86B-65B8484C7DE3}" type="datetimeFigureOut">
               <a:rPr lang="en-US" smtClean="0"/>
-              <a:t>1/28/2025</a:t>
+              <a:t>1/29/2025</a:t>
             </a:fld>
             <a:endParaRPr lang="en-US"/>
           </a:p>
@@ -3477,7 +3480,7 @@
           <a:p>
             <a:fld id="{3A8AB521-9182-4012-B86B-65B8484C7DE3}" type="datetimeFigureOut">
               <a:rPr lang="en-US" smtClean="0"/>
-              <a:t>1/28/2025</a:t>
+              <a:t>1/29/2025</a:t>
             </a:fld>
             <a:endParaRPr lang="en-US"/>
           </a:p>
@@ -3766,7 +3769,7 @@
           <a:p>
             <a:fld id="{3A8AB521-9182-4012-B86B-65B8484C7DE3}" type="datetimeFigureOut">
               <a:rPr lang="en-US" smtClean="0"/>
-              <a:t>1/28/2025</a:t>
+              <a:t>1/29/2025</a:t>
             </a:fld>
             <a:endParaRPr lang="en-US"/>
           </a:p>
@@ -4008,7 +4011,7 @@
           <a:p>
             <a:fld id="{3A8AB521-9182-4012-B86B-65B8484C7DE3}" type="datetimeFigureOut">
               <a:rPr lang="en-US" smtClean="0"/>
-              <a:t>1/28/2025</a:t>
+              <a:t>1/29/2025</a:t>
             </a:fld>
             <a:endParaRPr lang="en-US"/>
           </a:p>
@@ -4387,7 +4390,7 @@
           <a:p>
             <a:fld id="{3A8AB521-9182-4012-B86B-65B8484C7DE3}" type="datetimeFigureOut">
               <a:rPr lang="en-US" smtClean="0"/>
-              <a:t>1/28/2025</a:t>
+              <a:t>1/29/2025</a:t>
             </a:fld>
             <a:endParaRPr lang="en-US"/>
           </a:p>
@@ -4505,7 +4508,7 @@
           <a:p>
             <a:fld id="{3A8AB521-9182-4012-B86B-65B8484C7DE3}" type="datetimeFigureOut">
               <a:rPr lang="en-US" smtClean="0"/>
-              <a:t>1/28/2025</a:t>
+              <a:t>1/29/2025</a:t>
             </a:fld>
             <a:endParaRPr lang="en-US"/>
           </a:p>
@@ -4600,7 +4603,7 @@
           <a:p>
             <a:fld id="{3A8AB521-9182-4012-B86B-65B8484C7DE3}" type="datetimeFigureOut">
               <a:rPr lang="en-US" smtClean="0"/>
-              <a:t>1/28/2025</a:t>
+              <a:t>1/29/2025</a:t>
             </a:fld>
             <a:endParaRPr lang="en-US"/>
           </a:p>
@@ -4849,7 +4852,7 @@
           <a:p>
             <a:fld id="{3A8AB521-9182-4012-B86B-65B8484C7DE3}" type="datetimeFigureOut">
               <a:rPr lang="en-US" smtClean="0"/>
-              <a:t>1/28/2025</a:t>
+              <a:t>1/29/2025</a:t>
             </a:fld>
             <a:endParaRPr lang="en-US"/>
           </a:p>
@@ -5106,7 +5109,7 @@
           <a:p>
             <a:fld id="{3A8AB521-9182-4012-B86B-65B8484C7DE3}" type="datetimeFigureOut">
               <a:rPr lang="en-US" smtClean="0"/>
-              <a:t>1/28/2025</a:t>
+              <a:t>1/29/2025</a:t>
             </a:fld>
             <a:endParaRPr lang="en-US"/>
           </a:p>
@@ -5349,7 +5352,7 @@
           <a:p>
             <a:fld id="{3A8AB521-9182-4012-B86B-65B8484C7DE3}" type="datetimeFigureOut">
               <a:rPr lang="en-US" smtClean="0"/>
-              <a:t>1/28/2025</a:t>
+              <a:t>1/29/2025</a:t>
             </a:fld>
             <a:endParaRPr lang="en-US"/>
           </a:p>
@@ -5851,6 +5854,350 @@
           <p:cNvPr id="2" name="Title 1">
             <a:extLst>
               <a:ext uri="{FF2B5EF4-FFF2-40B4-BE49-F238E27FC236}">
+                <a16:creationId xmlns:a16="http://schemas.microsoft.com/office/drawing/2014/main" id="{68C17759-7906-4D29-87BE-D22351AA1AF3}"/>
+              </a:ext>
+            </a:extLst>
+          </p:cNvPr>
+          <p:cNvSpPr>
+            <a:spLocks noGrp="1"/>
+          </p:cNvSpPr>
+          <p:nvPr>
+            <p:ph type="title"/>
+          </p:nvPr>
+        </p:nvSpPr>
+        <p:spPr/>
+        <p:txBody>
+          <a:bodyPr/>
+          <a:lstStyle/>
+          <a:p>
+            <a:r>
+              <a:rPr lang="en-US" dirty="0"/>
+              <a:t>Strings </a:t>
+            </a:r>
+          </a:p>
+        </p:txBody>
+      </p:sp>
+      <p:sp>
+        <p:nvSpPr>
+          <p:cNvPr id="3" name="Content Placeholder 2">
+            <a:extLst>
+              <a:ext uri="{FF2B5EF4-FFF2-40B4-BE49-F238E27FC236}">
+                <a16:creationId xmlns:a16="http://schemas.microsoft.com/office/drawing/2014/main" id="{090DA997-1116-4BE0-8949-EB1EA734934D}"/>
+              </a:ext>
+            </a:extLst>
+          </p:cNvPr>
+          <p:cNvSpPr>
+            <a:spLocks noGrp="1"/>
+          </p:cNvSpPr>
+          <p:nvPr>
+            <p:ph idx="1"/>
+          </p:nvPr>
+        </p:nvSpPr>
+        <p:spPr/>
+        <p:txBody>
+          <a:bodyPr/>
+          <a:lstStyle/>
+          <a:p>
+            <a:r>
+              <a:rPr lang="en-US" dirty="0"/>
+              <a:t>Strings are basic sequence of characters or basically a text. </a:t>
+            </a:r>
+          </a:p>
+          <a:p>
+            <a:r>
+              <a:rPr lang="en-US" dirty="0"/>
+              <a:t>Strings are always surrounded by quotation marks </a:t>
+            </a:r>
+          </a:p>
+          <a:p>
+            <a:r>
+              <a:rPr lang="en-US" dirty="0"/>
+              <a:t>Keyword is str </a:t>
+            </a:r>
+          </a:p>
+          <a:p>
+            <a:r>
+              <a:rPr lang="en-US" dirty="0"/>
+              <a:t>Example </a:t>
+            </a:r>
+          </a:p>
+          <a:p>
+            <a:r>
+              <a:rPr lang="en-US" dirty="0"/>
+              <a:t>a = “my name is </a:t>
+            </a:r>
+            <a:r>
+              <a:rPr lang="en-US" dirty="0" err="1"/>
+              <a:t>xyz</a:t>
+            </a:r>
+            <a:r>
+              <a:rPr lang="en-US" dirty="0"/>
+              <a:t>” </a:t>
+            </a:r>
+          </a:p>
+          <a:p>
+            <a:r>
+              <a:rPr lang="en-US" dirty="0"/>
+              <a:t>Type function helps us determine what is the type of the variable it is. </a:t>
+            </a:r>
+          </a:p>
+          <a:p>
+            <a:endParaRPr lang="en-US" dirty="0"/>
+          </a:p>
+          <a:p>
+            <a:endParaRPr lang="en-US" dirty="0"/>
+          </a:p>
+          <a:p>
+            <a:endParaRPr lang="en-US" dirty="0"/>
+          </a:p>
+        </p:txBody>
+      </p:sp>
+    </p:spTree>
+    <p:extLst>
+      <p:ext uri="{BB962C8B-B14F-4D97-AF65-F5344CB8AC3E}">
+        <p14:creationId xmlns:p14="http://schemas.microsoft.com/office/powerpoint/2010/main" val="1284129504"/>
+      </p:ext>
+    </p:extLst>
+  </p:cSld>
+  <p:clrMapOvr>
+    <a:masterClrMapping/>
+  </p:clrMapOvr>
+</p:sld>
+</file>
+
+<file path=ppt/slides/slide11.xml><?xml version="1.0" encoding="utf-8"?>
+<p:sld xmlns:a="http://schemas.openxmlformats.org/drawingml/2006/main" xmlns:r="http://schemas.openxmlformats.org/officeDocument/2006/relationships" xmlns:p="http://schemas.openxmlformats.org/presentationml/2006/main">
+  <p:cSld>
+    <p:spTree>
+      <p:nvGrpSpPr>
+        <p:cNvPr id="1" name=""/>
+        <p:cNvGrpSpPr/>
+        <p:nvPr/>
+      </p:nvGrpSpPr>
+      <p:grpSpPr>
+        <a:xfrm>
+          <a:off x="0" y="0"/>
+          <a:ext cx="0" cy="0"/>
+          <a:chOff x="0" y="0"/>
+          <a:chExt cx="0" cy="0"/>
+        </a:xfrm>
+      </p:grpSpPr>
+      <p:sp>
+        <p:nvSpPr>
+          <p:cNvPr id="2" name="Title 1">
+            <a:extLst>
+              <a:ext uri="{FF2B5EF4-FFF2-40B4-BE49-F238E27FC236}">
+                <a16:creationId xmlns:a16="http://schemas.microsoft.com/office/drawing/2014/main" id="{49B61C72-FA3B-48EA-861D-46B179609540}"/>
+              </a:ext>
+            </a:extLst>
+          </p:cNvPr>
+          <p:cNvSpPr>
+            <a:spLocks noGrp="1"/>
+          </p:cNvSpPr>
+          <p:nvPr>
+            <p:ph type="title"/>
+          </p:nvPr>
+        </p:nvSpPr>
+        <p:spPr/>
+        <p:txBody>
+          <a:bodyPr/>
+          <a:lstStyle/>
+          <a:p>
+            <a:r>
+              <a:rPr lang="en-US" dirty="0" err="1"/>
+              <a:t>Concat</a:t>
+            </a:r>
+            <a:r>
+              <a:rPr lang="en-US" dirty="0"/>
+              <a:t> two strings </a:t>
+            </a:r>
+          </a:p>
+        </p:txBody>
+      </p:sp>
+      <p:sp>
+        <p:nvSpPr>
+          <p:cNvPr id="3" name="Content Placeholder 2">
+            <a:extLst>
+              <a:ext uri="{FF2B5EF4-FFF2-40B4-BE49-F238E27FC236}">
+                <a16:creationId xmlns:a16="http://schemas.microsoft.com/office/drawing/2014/main" id="{B802B224-EAED-4C5C-B364-1C2EE94BA9BE}"/>
+              </a:ext>
+            </a:extLst>
+          </p:cNvPr>
+          <p:cNvSpPr>
+            <a:spLocks noGrp="1"/>
+          </p:cNvSpPr>
+          <p:nvPr>
+            <p:ph idx="1"/>
+          </p:nvPr>
+        </p:nvSpPr>
+        <p:spPr/>
+        <p:txBody>
+          <a:bodyPr/>
+          <a:lstStyle/>
+          <a:p>
+            <a:r>
+              <a:rPr lang="en-US" dirty="0"/>
+              <a:t>a = “my name” </a:t>
+            </a:r>
+          </a:p>
+          <a:p>
+            <a:r>
+              <a:rPr lang="en-US" dirty="0"/>
+              <a:t>b = “</a:t>
+            </a:r>
+            <a:r>
+              <a:rPr lang="en-US" dirty="0" err="1"/>
+              <a:t>xyz</a:t>
+            </a:r>
+            <a:r>
+              <a:rPr lang="en-US" dirty="0"/>
+              <a:t>” </a:t>
+            </a:r>
+          </a:p>
+          <a:p>
+            <a:r>
+              <a:rPr lang="en-US" dirty="0"/>
+              <a:t>c = a + b</a:t>
+            </a:r>
+          </a:p>
+          <a:p>
+            <a:r>
+              <a:rPr lang="en-US" dirty="0"/>
+              <a:t>Print(c) </a:t>
+            </a:r>
+          </a:p>
+          <a:p>
+            <a:endParaRPr lang="en-US" dirty="0"/>
+          </a:p>
+        </p:txBody>
+      </p:sp>
+    </p:spTree>
+    <p:extLst>
+      <p:ext uri="{BB962C8B-B14F-4D97-AF65-F5344CB8AC3E}">
+        <p14:creationId xmlns:p14="http://schemas.microsoft.com/office/powerpoint/2010/main" val="2001054306"/>
+      </p:ext>
+    </p:extLst>
+  </p:cSld>
+  <p:clrMapOvr>
+    <a:masterClrMapping/>
+  </p:clrMapOvr>
+</p:sld>
+</file>
+
+<file path=ppt/slides/slide12.xml><?xml version="1.0" encoding="utf-8"?>
+<p:sld xmlns:a="http://schemas.openxmlformats.org/drawingml/2006/main" xmlns:r="http://schemas.openxmlformats.org/officeDocument/2006/relationships" xmlns:p="http://schemas.openxmlformats.org/presentationml/2006/main">
+  <p:cSld>
+    <p:spTree>
+      <p:nvGrpSpPr>
+        <p:cNvPr id="1" name=""/>
+        <p:cNvGrpSpPr/>
+        <p:nvPr/>
+      </p:nvGrpSpPr>
+      <p:grpSpPr>
+        <a:xfrm>
+          <a:off x="0" y="0"/>
+          <a:ext cx="0" cy="0"/>
+          <a:chOff x="0" y="0"/>
+          <a:chExt cx="0" cy="0"/>
+        </a:xfrm>
+      </p:grpSpPr>
+      <p:sp>
+        <p:nvSpPr>
+          <p:cNvPr id="2" name="Title 1">
+            <a:extLst>
+              <a:ext uri="{FF2B5EF4-FFF2-40B4-BE49-F238E27FC236}">
+                <a16:creationId xmlns:a16="http://schemas.microsoft.com/office/drawing/2014/main" id="{205C3B8C-9D53-454F-B981-097863C227DB}"/>
+              </a:ext>
+            </a:extLst>
+          </p:cNvPr>
+          <p:cNvSpPr>
+            <a:spLocks noGrp="1"/>
+          </p:cNvSpPr>
+          <p:nvPr>
+            <p:ph type="title"/>
+          </p:nvPr>
+        </p:nvSpPr>
+        <p:spPr/>
+        <p:txBody>
+          <a:bodyPr/>
+          <a:lstStyle/>
+          <a:p>
+            <a:r>
+              <a:rPr lang="en-US" dirty="0"/>
+              <a:t>Booleans</a:t>
+            </a:r>
+          </a:p>
+        </p:txBody>
+      </p:sp>
+      <p:sp>
+        <p:nvSpPr>
+          <p:cNvPr id="3" name="Content Placeholder 2">
+            <a:extLst>
+              <a:ext uri="{FF2B5EF4-FFF2-40B4-BE49-F238E27FC236}">
+                <a16:creationId xmlns:a16="http://schemas.microsoft.com/office/drawing/2014/main" id="{1A6E18F8-09FE-4FCF-B718-E1F5A121B8DC}"/>
+              </a:ext>
+            </a:extLst>
+          </p:cNvPr>
+          <p:cNvSpPr>
+            <a:spLocks noGrp="1"/>
+          </p:cNvSpPr>
+          <p:nvPr>
+            <p:ph idx="1"/>
+          </p:nvPr>
+        </p:nvSpPr>
+        <p:spPr/>
+        <p:txBody>
+          <a:bodyPr/>
+          <a:lstStyle/>
+          <a:p>
+            <a:r>
+              <a:rPr lang="en-US" dirty="0"/>
+              <a:t>It can be True or False </a:t>
+            </a:r>
+          </a:p>
+          <a:p>
+            <a:r>
+              <a:rPr lang="en-US" dirty="0"/>
+              <a:t>Keyword bool </a:t>
+            </a:r>
+          </a:p>
+        </p:txBody>
+      </p:sp>
+    </p:spTree>
+    <p:extLst>
+      <p:ext uri="{BB962C8B-B14F-4D97-AF65-F5344CB8AC3E}">
+        <p14:creationId xmlns:p14="http://schemas.microsoft.com/office/powerpoint/2010/main" val="3800990825"/>
+      </p:ext>
+    </p:extLst>
+  </p:cSld>
+  <p:clrMapOvr>
+    <a:masterClrMapping/>
+  </p:clrMapOvr>
+</p:sld>
+</file>
+
+<file path=ppt/slides/slide13.xml><?xml version="1.0" encoding="utf-8"?>
+<p:sld xmlns:a="http://schemas.openxmlformats.org/drawingml/2006/main" xmlns:r="http://schemas.openxmlformats.org/officeDocument/2006/relationships" xmlns:p="http://schemas.openxmlformats.org/presentationml/2006/main">
+  <p:cSld>
+    <p:spTree>
+      <p:nvGrpSpPr>
+        <p:cNvPr id="1" name=""/>
+        <p:cNvGrpSpPr/>
+        <p:nvPr/>
+      </p:nvGrpSpPr>
+      <p:grpSpPr>
+        <a:xfrm>
+          <a:off x="0" y="0"/>
+          <a:ext cx="0" cy="0"/>
+          <a:chOff x="0" y="0"/>
+          <a:chExt cx="0" cy="0"/>
+        </a:xfrm>
+      </p:grpSpPr>
+      <p:sp>
+        <p:nvSpPr>
+          <p:cNvPr id="2" name="Title 1">
+            <a:extLst>
+              <a:ext uri="{FF2B5EF4-FFF2-40B4-BE49-F238E27FC236}">
                 <a16:creationId xmlns:a16="http://schemas.microsoft.com/office/drawing/2014/main" id="{128D4019-7D0C-4EA9-BA87-63BDDAAF6BAB}"/>
               </a:ext>
             </a:extLst>
@@ -6160,7 +6507,7 @@
 </p:sld>
 </file>
 
-<file path=ppt/slides/slide11.xml><?xml version="1.0" encoding="utf-8"?>
+<file path=ppt/slides/slide14.xml><?xml version="1.0" encoding="utf-8"?>
 <p:sld xmlns:a="http://schemas.openxmlformats.org/drawingml/2006/main" xmlns:r="http://schemas.openxmlformats.org/officeDocument/2006/relationships" xmlns:p="http://schemas.openxmlformats.org/presentationml/2006/main">
   <p:cSld>
     <p:spTree>
@@ -6755,7 +7102,7 @@
 </p:sld>
 </file>
 
-<file path=ppt/slides/slide12.xml><?xml version="1.0" encoding="utf-8"?>
+<file path=ppt/slides/slide15.xml><?xml version="1.0" encoding="utf-8"?>
 <p:sld xmlns:a="http://schemas.openxmlformats.org/drawingml/2006/main" xmlns:r="http://schemas.openxmlformats.org/officeDocument/2006/relationships" xmlns:p="http://schemas.openxmlformats.org/presentationml/2006/main">
   <p:cSld>
     <p:spTree>
@@ -7285,7 +7632,7 @@
 </p:sld>
 </file>
 
-<file path=ppt/slides/slide13.xml><?xml version="1.0" encoding="utf-8"?>
+<file path=ppt/slides/slide16.xml><?xml version="1.0" encoding="utf-8"?>
 <p:sld xmlns:a="http://schemas.openxmlformats.org/drawingml/2006/main" xmlns:r="http://schemas.openxmlformats.org/officeDocument/2006/relationships" xmlns:p="http://schemas.openxmlformats.org/presentationml/2006/main">
   <p:cSld>
     <p:spTree>
@@ -7821,7 +8168,7 @@
 </p:sld>
 </file>
 
-<file path=ppt/slides/slide14.xml><?xml version="1.0" encoding="utf-8"?>
+<file path=ppt/slides/slide17.xml><?xml version="1.0" encoding="utf-8"?>
 <p:sld xmlns:a="http://schemas.openxmlformats.org/drawingml/2006/main" xmlns:r="http://schemas.openxmlformats.org/officeDocument/2006/relationships" xmlns:p="http://schemas.openxmlformats.org/presentationml/2006/main">
   <p:cSld>
     <p:spTree>
@@ -8304,7 +8651,7 @@
 </p:sld>
 </file>
 
-<file path=ppt/slides/slide15.xml><?xml version="1.0" encoding="utf-8"?>
+<file path=ppt/slides/slide18.xml><?xml version="1.0" encoding="utf-8"?>
 <p:sld xmlns:a="http://schemas.openxmlformats.org/drawingml/2006/main" xmlns:r="http://schemas.openxmlformats.org/officeDocument/2006/relationships" xmlns:p="http://schemas.openxmlformats.org/presentationml/2006/main">
   <p:cSld>
     <p:spTree>
@@ -8558,7 +8905,7 @@
 </p:sld>
 </file>
 
-<file path=ppt/slides/slide16.xml><?xml version="1.0" encoding="utf-8"?>
+<file path=ppt/slides/slide19.xml><?xml version="1.0" encoding="utf-8"?>
 <p:sld xmlns:a="http://schemas.openxmlformats.org/drawingml/2006/main" xmlns:r="http://schemas.openxmlformats.org/officeDocument/2006/relationships" xmlns:p="http://schemas.openxmlformats.org/presentationml/2006/main">
   <p:cSld>
     <p:spTree>
@@ -9136,6 +9483,540 @@
           <p:cNvPr id="2" name="Title 1">
             <a:extLst>
               <a:ext uri="{FF2B5EF4-FFF2-40B4-BE49-F238E27FC236}">
+                <a16:creationId xmlns:a16="http://schemas.microsoft.com/office/drawing/2014/main" id="{93400956-8BF4-4DC4-B74D-16DE4C92C7B6}"/>
+              </a:ext>
+            </a:extLst>
+          </p:cNvPr>
+          <p:cNvSpPr>
+            <a:spLocks noGrp="1"/>
+          </p:cNvSpPr>
+          <p:nvPr>
+            <p:ph type="title"/>
+          </p:nvPr>
+        </p:nvSpPr>
+        <p:spPr/>
+        <p:txBody>
+          <a:bodyPr/>
+          <a:lstStyle/>
+          <a:p>
+            <a:r>
+              <a:rPr lang="en-US" dirty="0"/>
+              <a:t>Git hub Account </a:t>
+            </a:r>
+          </a:p>
+        </p:txBody>
+      </p:sp>
+      <p:sp>
+        <p:nvSpPr>
+          <p:cNvPr id="3" name="Content Placeholder 2">
+            <a:extLst>
+              <a:ext uri="{FF2B5EF4-FFF2-40B4-BE49-F238E27FC236}">
+                <a16:creationId xmlns:a16="http://schemas.microsoft.com/office/drawing/2014/main" id="{A0D1559B-3F36-4AB2-890A-DB02BDD903B9}"/>
+              </a:ext>
+            </a:extLst>
+          </p:cNvPr>
+          <p:cNvSpPr>
+            <a:spLocks noGrp="1"/>
+          </p:cNvSpPr>
+          <p:nvPr>
+            <p:ph idx="1"/>
+          </p:nvPr>
+        </p:nvSpPr>
+        <p:spPr/>
+        <p:txBody>
+          <a:bodyPr>
+            <a:normAutofit fontScale="92500" lnSpcReduction="20000"/>
+          </a:bodyPr>
+          <a:lstStyle/>
+          <a:p>
+            <a:r>
+              <a:rPr lang="en-US" b="1" dirty="0"/>
+              <a:t>1. Creating a GitHub Account</a:t>
+            </a:r>
+            <a:endParaRPr lang="en-US" dirty="0"/>
+          </a:p>
+          <a:p>
+            <a:pPr>
+              <a:buFont typeface="Arial" panose="020B0604020202020204" pitchFamily="34" charset="0"/>
+              <a:buChar char="•"/>
+            </a:pPr>
+            <a:r>
+              <a:rPr lang="en-US" b="1" dirty="0"/>
+              <a:t>Go to GitHub:</a:t>
+            </a:r>
+            <a:r>
+              <a:rPr lang="en-US" dirty="0"/>
+              <a:t> Open your web browser and navigate to </a:t>
+            </a:r>
+            <a:r>
+              <a:rPr lang="en-US" dirty="0">
+                <a:hlinkClick r:id="rId2"/>
+              </a:rPr>
+              <a:t>https://github.com/</a:t>
+            </a:r>
+            <a:endParaRPr lang="en-US" dirty="0"/>
+          </a:p>
+          <a:p>
+            <a:pPr>
+              <a:buFont typeface="Arial" panose="020B0604020202020204" pitchFamily="34" charset="0"/>
+              <a:buChar char="•"/>
+            </a:pPr>
+            <a:r>
+              <a:rPr lang="en-US" b="1" dirty="0"/>
+              <a:t>Sign Up:</a:t>
+            </a:r>
+            <a:r>
+              <a:rPr lang="en-US" dirty="0"/>
+              <a:t> Click the "Sign up" button.</a:t>
+            </a:r>
+          </a:p>
+          <a:p>
+            <a:pPr>
+              <a:buFont typeface="Arial" panose="020B0604020202020204" pitchFamily="34" charset="0"/>
+              <a:buChar char="•"/>
+            </a:pPr>
+            <a:r>
+              <a:rPr lang="en-US" b="1" dirty="0"/>
+              <a:t>Enter Information:</a:t>
+            </a:r>
+            <a:r>
+              <a:rPr lang="en-US" dirty="0"/>
+              <a:t> </a:t>
+            </a:r>
+          </a:p>
+          <a:p>
+            <a:pPr marL="742950" lvl="1" indent="-285750">
+              <a:buFont typeface="Arial" panose="020B0604020202020204" pitchFamily="34" charset="0"/>
+              <a:buChar char="•"/>
+            </a:pPr>
+            <a:r>
+              <a:rPr lang="en-US" dirty="0"/>
+              <a:t>Provide your email address.</a:t>
+            </a:r>
+          </a:p>
+          <a:p>
+            <a:pPr marL="742950" lvl="1" indent="-285750">
+              <a:buFont typeface="Arial" panose="020B0604020202020204" pitchFamily="34" charset="0"/>
+              <a:buChar char="•"/>
+            </a:pPr>
+            <a:r>
+              <a:rPr lang="en-US" dirty="0"/>
+              <a:t>Create a strong password (at least 15 characters or 8 with a mix of letters and numbers).</a:t>
+            </a:r>
+          </a:p>
+          <a:p>
+            <a:pPr marL="742950" lvl="1" indent="-285750">
+              <a:buFont typeface="Arial" panose="020B0604020202020204" pitchFamily="34" charset="0"/>
+              <a:buChar char="•"/>
+            </a:pPr>
+            <a:r>
+              <a:rPr lang="en-US" dirty="0"/>
+              <a:t>Choose a username for your GitHub profile.</a:t>
+            </a:r>
+          </a:p>
+          <a:p>
+            <a:pPr>
+              <a:buFont typeface="Arial" panose="020B0604020202020204" pitchFamily="34" charset="0"/>
+              <a:buChar char="•"/>
+            </a:pPr>
+            <a:r>
+              <a:rPr lang="en-US" b="1" dirty="0"/>
+              <a:t>Verify Email:</a:t>
+            </a:r>
+            <a:r>
+              <a:rPr lang="en-US" dirty="0"/>
+              <a:t> Check your email inbox for a verification code from GitHub. Enter this code on the GitHub page.</a:t>
+            </a:r>
+          </a:p>
+          <a:p>
+            <a:pPr>
+              <a:buFont typeface="Arial" panose="020B0604020202020204" pitchFamily="34" charset="0"/>
+              <a:buChar char="•"/>
+            </a:pPr>
+            <a:r>
+              <a:rPr lang="en-US" b="1" dirty="0"/>
+              <a:t>Personalize (Optional):</a:t>
+            </a:r>
+            <a:r>
+              <a:rPr lang="en-US" dirty="0"/>
+              <a:t> GitHub may ask you some questions to personalize your experience. You can skip this step.</a:t>
+            </a:r>
+          </a:p>
+          <a:p>
+            <a:pPr>
+              <a:buFont typeface="Arial" panose="020B0604020202020204" pitchFamily="34" charset="0"/>
+              <a:buChar char="•"/>
+            </a:pPr>
+            <a:r>
+              <a:rPr lang="en-US" b="1" dirty="0"/>
+              <a:t>Choose a Plan:</a:t>
+            </a:r>
+            <a:r>
+              <a:rPr lang="en-US" dirty="0"/>
+              <a:t> Select the "Free" plan to start.</a:t>
+            </a:r>
+          </a:p>
+          <a:p>
+            <a:endParaRPr lang="en-US" dirty="0"/>
+          </a:p>
+        </p:txBody>
+      </p:sp>
+    </p:spTree>
+    <p:extLst>
+      <p:ext uri="{BB962C8B-B14F-4D97-AF65-F5344CB8AC3E}">
+        <p14:creationId xmlns:p14="http://schemas.microsoft.com/office/powerpoint/2010/main" val="2052477399"/>
+      </p:ext>
+    </p:extLst>
+  </p:cSld>
+  <p:clrMapOvr>
+    <a:masterClrMapping/>
+  </p:clrMapOvr>
+</p:sld>
+</file>
+
+<file path=ppt/slides/slide7.xml><?xml version="1.0" encoding="utf-8"?>
+<p:sld xmlns:a="http://schemas.openxmlformats.org/drawingml/2006/main" xmlns:r="http://schemas.openxmlformats.org/officeDocument/2006/relationships" xmlns:p="http://schemas.openxmlformats.org/presentationml/2006/main">
+  <p:cSld>
+    <p:spTree>
+      <p:nvGrpSpPr>
+        <p:cNvPr id="1" name=""/>
+        <p:cNvGrpSpPr/>
+        <p:nvPr/>
+      </p:nvGrpSpPr>
+      <p:grpSpPr>
+        <a:xfrm>
+          <a:off x="0" y="0"/>
+          <a:ext cx="0" cy="0"/>
+          <a:chOff x="0" y="0"/>
+          <a:chExt cx="0" cy="0"/>
+        </a:xfrm>
+      </p:grpSpPr>
+      <p:sp>
+        <p:nvSpPr>
+          <p:cNvPr id="2" name="Title 1">
+            <a:extLst>
+              <a:ext uri="{FF2B5EF4-FFF2-40B4-BE49-F238E27FC236}">
+                <a16:creationId xmlns:a16="http://schemas.microsoft.com/office/drawing/2014/main" id="{EE572F86-F6A3-40C5-AB45-527B15AE534B}"/>
+              </a:ext>
+            </a:extLst>
+          </p:cNvPr>
+          <p:cNvSpPr>
+            <a:spLocks noGrp="1"/>
+          </p:cNvSpPr>
+          <p:nvPr>
+            <p:ph type="title"/>
+          </p:nvPr>
+        </p:nvSpPr>
+        <p:spPr/>
+        <p:txBody>
+          <a:bodyPr/>
+          <a:lstStyle/>
+          <a:p>
+            <a:r>
+              <a:rPr lang="en-US" dirty="0"/>
+              <a:t>Git Hub Account </a:t>
+            </a:r>
+          </a:p>
+        </p:txBody>
+      </p:sp>
+      <p:sp>
+        <p:nvSpPr>
+          <p:cNvPr id="3" name="Content Placeholder 2">
+            <a:extLst>
+              <a:ext uri="{FF2B5EF4-FFF2-40B4-BE49-F238E27FC236}">
+                <a16:creationId xmlns:a16="http://schemas.microsoft.com/office/drawing/2014/main" id="{FE4A90C8-6BBF-4E5B-87A3-4536CEB6185C}"/>
+              </a:ext>
+            </a:extLst>
+          </p:cNvPr>
+          <p:cNvSpPr>
+            <a:spLocks noGrp="1"/>
+          </p:cNvSpPr>
+          <p:nvPr>
+            <p:ph idx="1"/>
+          </p:nvPr>
+        </p:nvSpPr>
+        <p:spPr/>
+        <p:txBody>
+          <a:bodyPr/>
+          <a:lstStyle/>
+          <a:p>
+            <a:r>
+              <a:rPr lang="en-US" b="1" dirty="0"/>
+              <a:t>2. Accessing Code on GitHub</a:t>
+            </a:r>
+            <a:endParaRPr lang="en-US" dirty="0"/>
+          </a:p>
+          <a:p>
+            <a:pPr>
+              <a:buFont typeface="Arial" panose="020B0604020202020204" pitchFamily="34" charset="0"/>
+              <a:buChar char="•"/>
+            </a:pPr>
+            <a:r>
+              <a:rPr lang="en-US" b="1" dirty="0"/>
+              <a:t>Find the Repository:</a:t>
+            </a:r>
+            <a:r>
+              <a:rPr lang="en-US" dirty="0"/>
+              <a:t> Go to the specific repository URL (in this case, </a:t>
+            </a:r>
+            <a:r>
+              <a:rPr lang="en-US" dirty="0">
+                <a:hlinkClick r:id="rId2"/>
+              </a:rPr>
+              <a:t>https://github.com/avnit/Python-for-everyone</a:t>
+            </a:r>
+            <a:r>
+              <a:rPr lang="en-US" dirty="0"/>
+              <a:t>).</a:t>
+            </a:r>
+          </a:p>
+          <a:p>
+            <a:pPr>
+              <a:buFont typeface="Arial" panose="020B0604020202020204" pitchFamily="34" charset="0"/>
+              <a:buChar char="•"/>
+            </a:pPr>
+            <a:r>
+              <a:rPr lang="en-US" b="1" dirty="0"/>
+              <a:t>View Code:</a:t>
+            </a:r>
+            <a:r>
+              <a:rPr lang="en-US" dirty="0"/>
+              <a:t> </a:t>
+            </a:r>
+          </a:p>
+          <a:p>
+            <a:pPr marL="742950" lvl="1" indent="-285750">
+              <a:buFont typeface="Arial" panose="020B0604020202020204" pitchFamily="34" charset="0"/>
+              <a:buChar char="•"/>
+            </a:pPr>
+            <a:r>
+              <a:rPr lang="en-US" b="1" dirty="0"/>
+              <a:t>Browse Files:</a:t>
+            </a:r>
+            <a:r>
+              <a:rPr lang="en-US" dirty="0"/>
+              <a:t> You can directly view the code files within the repository by clicking on them.</a:t>
+            </a:r>
+          </a:p>
+          <a:p>
+            <a:pPr marL="742950" lvl="1" indent="-285750">
+              <a:buFont typeface="Arial" panose="020B0604020202020204" pitchFamily="34" charset="0"/>
+              <a:buChar char="•"/>
+            </a:pPr>
+            <a:r>
+              <a:rPr lang="en-US" b="1" dirty="0"/>
+              <a:t>Download ZIP:</a:t>
+            </a:r>
+            <a:r>
+              <a:rPr lang="en-US" dirty="0"/>
+              <a:t> Download the entire repository as a ZIP file by clicking the green "Code" button and then "Download ZIP."</a:t>
+            </a:r>
+          </a:p>
+          <a:p>
+            <a:pPr marL="742950" lvl="1" indent="-285750">
+              <a:buFont typeface="Arial" panose="020B0604020202020204" pitchFamily="34" charset="0"/>
+              <a:buChar char="•"/>
+            </a:pPr>
+            <a:r>
+              <a:rPr lang="en-US" b="1" dirty="0"/>
+              <a:t>Clone the Repository:</a:t>
+            </a:r>
+            <a:r>
+              <a:rPr lang="en-US" dirty="0"/>
+              <a:t> </a:t>
+            </a:r>
+          </a:p>
+          <a:p>
+            <a:pPr marL="1143000" lvl="2" indent="-228600">
+              <a:buFont typeface="Arial" panose="020B0604020202020204" pitchFamily="34" charset="0"/>
+              <a:buChar char="•"/>
+            </a:pPr>
+            <a:r>
+              <a:rPr lang="en-US" dirty="0"/>
+              <a:t>If you're familiar with Git, you can clone the repository to your local machine using the provided URL. This allows you to work with the code directly on your computer and contribute changes back to the repository.</a:t>
+            </a:r>
+          </a:p>
+          <a:p>
+            <a:endParaRPr lang="en-US" dirty="0"/>
+          </a:p>
+        </p:txBody>
+      </p:sp>
+    </p:spTree>
+    <p:extLst>
+      <p:ext uri="{BB962C8B-B14F-4D97-AF65-F5344CB8AC3E}">
+        <p14:creationId xmlns:p14="http://schemas.microsoft.com/office/powerpoint/2010/main" val="440196581"/>
+      </p:ext>
+    </p:extLst>
+  </p:cSld>
+  <p:clrMapOvr>
+    <a:masterClrMapping/>
+  </p:clrMapOvr>
+</p:sld>
+</file>
+
+<file path=ppt/slides/slide8.xml><?xml version="1.0" encoding="utf-8"?>
+<p:sld xmlns:a="http://schemas.openxmlformats.org/drawingml/2006/main" xmlns:r="http://schemas.openxmlformats.org/officeDocument/2006/relationships" xmlns:p="http://schemas.openxmlformats.org/presentationml/2006/main">
+  <p:cSld>
+    <p:spTree>
+      <p:nvGrpSpPr>
+        <p:cNvPr id="1" name=""/>
+        <p:cNvGrpSpPr/>
+        <p:nvPr/>
+      </p:nvGrpSpPr>
+      <p:grpSpPr>
+        <a:xfrm>
+          <a:off x="0" y="0"/>
+          <a:ext cx="0" cy="0"/>
+          <a:chOff x="0" y="0"/>
+          <a:chExt cx="0" cy="0"/>
+        </a:xfrm>
+      </p:grpSpPr>
+      <p:sp>
+        <p:nvSpPr>
+          <p:cNvPr id="2" name="Title 1">
+            <a:extLst>
+              <a:ext uri="{FF2B5EF4-FFF2-40B4-BE49-F238E27FC236}">
+                <a16:creationId xmlns:a16="http://schemas.microsoft.com/office/drawing/2014/main" id="{F0CC21BB-BF01-4217-A093-56B122E1F12D}"/>
+              </a:ext>
+            </a:extLst>
+          </p:cNvPr>
+          <p:cNvSpPr>
+            <a:spLocks noGrp="1"/>
+          </p:cNvSpPr>
+          <p:nvPr>
+            <p:ph type="title"/>
+          </p:nvPr>
+        </p:nvSpPr>
+        <p:spPr/>
+        <p:txBody>
+          <a:bodyPr/>
+          <a:lstStyle/>
+          <a:p>
+            <a:r>
+              <a:rPr lang="en-US" dirty="0"/>
+              <a:t>Git Hub Basics</a:t>
+            </a:r>
+          </a:p>
+        </p:txBody>
+      </p:sp>
+      <p:sp>
+        <p:nvSpPr>
+          <p:cNvPr id="3" name="Content Placeholder 2">
+            <a:extLst>
+              <a:ext uri="{FF2B5EF4-FFF2-40B4-BE49-F238E27FC236}">
+                <a16:creationId xmlns:a16="http://schemas.microsoft.com/office/drawing/2014/main" id="{BBB7CE23-3451-4ABD-85C9-7B9DAB2EA6F3}"/>
+              </a:ext>
+            </a:extLst>
+          </p:cNvPr>
+          <p:cNvSpPr>
+            <a:spLocks noGrp="1"/>
+          </p:cNvSpPr>
+          <p:nvPr>
+            <p:ph idx="1"/>
+          </p:nvPr>
+        </p:nvSpPr>
+        <p:spPr/>
+        <p:txBody>
+          <a:bodyPr/>
+          <a:lstStyle/>
+          <a:p>
+            <a:pPr>
+              <a:buFont typeface="Arial" panose="020B0604020202020204" pitchFamily="34" charset="0"/>
+              <a:buChar char="•"/>
+            </a:pPr>
+            <a:r>
+              <a:rPr lang="en-US" b="1" dirty="0"/>
+              <a:t>Public vs. Private Repositories:</a:t>
+            </a:r>
+            <a:r>
+              <a:rPr lang="en-US" dirty="0"/>
+              <a:t> </a:t>
+            </a:r>
+          </a:p>
+          <a:p>
+            <a:pPr marL="742950" lvl="1" indent="-285750">
+              <a:buFont typeface="Arial" panose="020B0604020202020204" pitchFamily="34" charset="0"/>
+              <a:buChar char="•"/>
+            </a:pPr>
+            <a:r>
+              <a:rPr lang="en-US" dirty="0"/>
+              <a:t>Public repositories are visible to everyone on GitHub.</a:t>
+            </a:r>
+          </a:p>
+          <a:p>
+            <a:pPr marL="742950" lvl="1" indent="-285750">
+              <a:buFont typeface="Arial" panose="020B0604020202020204" pitchFamily="34" charset="0"/>
+              <a:buChar char="•"/>
+            </a:pPr>
+            <a:r>
+              <a:rPr lang="en-US" dirty="0"/>
+              <a:t>Private repositories require a GitHub account to access and are only visible to you and collaborators you invite.</a:t>
+            </a:r>
+          </a:p>
+          <a:p>
+            <a:pPr>
+              <a:buFont typeface="Arial" panose="020B0604020202020204" pitchFamily="34" charset="0"/>
+              <a:buChar char="•"/>
+            </a:pPr>
+            <a:r>
+              <a:rPr lang="en-US" b="1" dirty="0"/>
+              <a:t>Forking a Repository:</a:t>
+            </a:r>
+            <a:r>
+              <a:rPr lang="en-US" dirty="0"/>
+              <a:t> </a:t>
+            </a:r>
+          </a:p>
+          <a:p>
+            <a:pPr marL="742950" lvl="1" indent="-285750">
+              <a:buFont typeface="Arial" panose="020B0604020202020204" pitchFamily="34" charset="0"/>
+              <a:buChar char="•"/>
+            </a:pPr>
+            <a:r>
+              <a:rPr lang="en-US" dirty="0"/>
+              <a:t>If you want to make changes to the code without affecting the original repository, you can "fork" it. This creates a copy of the repository under your own GitHub account.</a:t>
+            </a:r>
+          </a:p>
+          <a:p>
+            <a:endParaRPr lang="en-US" dirty="0"/>
+          </a:p>
+        </p:txBody>
+      </p:sp>
+    </p:spTree>
+    <p:extLst>
+      <p:ext uri="{BB962C8B-B14F-4D97-AF65-F5344CB8AC3E}">
+        <p14:creationId xmlns:p14="http://schemas.microsoft.com/office/powerpoint/2010/main" val="2524350961"/>
+      </p:ext>
+    </p:extLst>
+  </p:cSld>
+  <p:clrMapOvr>
+    <a:masterClrMapping/>
+  </p:clrMapOvr>
+</p:sld>
+</file>
+
+<file path=ppt/slides/slide9.xml><?xml version="1.0" encoding="utf-8"?>
+<p:sld xmlns:a="http://schemas.openxmlformats.org/drawingml/2006/main" xmlns:r="http://schemas.openxmlformats.org/officeDocument/2006/relationships" xmlns:p="http://schemas.openxmlformats.org/presentationml/2006/main">
+  <p:cSld>
+    <p:spTree>
+      <p:nvGrpSpPr>
+        <p:cNvPr id="1" name=""/>
+        <p:cNvGrpSpPr/>
+        <p:nvPr/>
+      </p:nvGrpSpPr>
+      <p:grpSpPr>
+        <a:xfrm>
+          <a:off x="0" y="0"/>
+          <a:ext cx="0" cy="0"/>
+          <a:chOff x="0" y="0"/>
+          <a:chExt cx="0" cy="0"/>
+        </a:xfrm>
+      </p:grpSpPr>
+      <p:sp>
+        <p:nvSpPr>
+          <p:cNvPr id="2" name="Title 1">
+            <a:extLst>
+              <a:ext uri="{FF2B5EF4-FFF2-40B4-BE49-F238E27FC236}">
                 <a16:creationId xmlns:a16="http://schemas.microsoft.com/office/drawing/2014/main" id="{0A70B62E-93A4-4710-B292-D0EDA68BFFE4}"/>
               </a:ext>
             </a:extLst>
@@ -9445,350 +10326,6 @@
     <p:extLst>
       <p:ext uri="{BB962C8B-B14F-4D97-AF65-F5344CB8AC3E}">
         <p14:creationId xmlns:p14="http://schemas.microsoft.com/office/powerpoint/2010/main" val="2561386226"/>
-      </p:ext>
-    </p:extLst>
-  </p:cSld>
-  <p:clrMapOvr>
-    <a:masterClrMapping/>
-  </p:clrMapOvr>
-</p:sld>
-</file>
-
-<file path=ppt/slides/slide7.xml><?xml version="1.0" encoding="utf-8"?>
-<p:sld xmlns:a="http://schemas.openxmlformats.org/drawingml/2006/main" xmlns:r="http://schemas.openxmlformats.org/officeDocument/2006/relationships" xmlns:p="http://schemas.openxmlformats.org/presentationml/2006/main">
-  <p:cSld>
-    <p:spTree>
-      <p:nvGrpSpPr>
-        <p:cNvPr id="1" name=""/>
-        <p:cNvGrpSpPr/>
-        <p:nvPr/>
-      </p:nvGrpSpPr>
-      <p:grpSpPr>
-        <a:xfrm>
-          <a:off x="0" y="0"/>
-          <a:ext cx="0" cy="0"/>
-          <a:chOff x="0" y="0"/>
-          <a:chExt cx="0" cy="0"/>
-        </a:xfrm>
-      </p:grpSpPr>
-      <p:sp>
-        <p:nvSpPr>
-          <p:cNvPr id="2" name="Title 1">
-            <a:extLst>
-              <a:ext uri="{FF2B5EF4-FFF2-40B4-BE49-F238E27FC236}">
-                <a16:creationId xmlns:a16="http://schemas.microsoft.com/office/drawing/2014/main" id="{68C17759-7906-4D29-87BE-D22351AA1AF3}"/>
-              </a:ext>
-            </a:extLst>
-          </p:cNvPr>
-          <p:cNvSpPr>
-            <a:spLocks noGrp="1"/>
-          </p:cNvSpPr>
-          <p:nvPr>
-            <p:ph type="title"/>
-          </p:nvPr>
-        </p:nvSpPr>
-        <p:spPr/>
-        <p:txBody>
-          <a:bodyPr/>
-          <a:lstStyle/>
-          <a:p>
-            <a:r>
-              <a:rPr lang="en-US" dirty="0"/>
-              <a:t>Strings </a:t>
-            </a:r>
-          </a:p>
-        </p:txBody>
-      </p:sp>
-      <p:sp>
-        <p:nvSpPr>
-          <p:cNvPr id="3" name="Content Placeholder 2">
-            <a:extLst>
-              <a:ext uri="{FF2B5EF4-FFF2-40B4-BE49-F238E27FC236}">
-                <a16:creationId xmlns:a16="http://schemas.microsoft.com/office/drawing/2014/main" id="{090DA997-1116-4BE0-8949-EB1EA734934D}"/>
-              </a:ext>
-            </a:extLst>
-          </p:cNvPr>
-          <p:cNvSpPr>
-            <a:spLocks noGrp="1"/>
-          </p:cNvSpPr>
-          <p:nvPr>
-            <p:ph idx="1"/>
-          </p:nvPr>
-        </p:nvSpPr>
-        <p:spPr/>
-        <p:txBody>
-          <a:bodyPr/>
-          <a:lstStyle/>
-          <a:p>
-            <a:r>
-              <a:rPr lang="en-US" dirty="0"/>
-              <a:t>Strings are basic sequence of characters or basically a text. </a:t>
-            </a:r>
-          </a:p>
-          <a:p>
-            <a:r>
-              <a:rPr lang="en-US" dirty="0"/>
-              <a:t>Strings are always surrounded by quotation marks </a:t>
-            </a:r>
-          </a:p>
-          <a:p>
-            <a:r>
-              <a:rPr lang="en-US" dirty="0"/>
-              <a:t>Keyword is str </a:t>
-            </a:r>
-          </a:p>
-          <a:p>
-            <a:r>
-              <a:rPr lang="en-US" dirty="0"/>
-              <a:t>Example </a:t>
-            </a:r>
-          </a:p>
-          <a:p>
-            <a:r>
-              <a:rPr lang="en-US" dirty="0"/>
-              <a:t>a = “my name is </a:t>
-            </a:r>
-            <a:r>
-              <a:rPr lang="en-US" dirty="0" err="1"/>
-              <a:t>xyz</a:t>
-            </a:r>
-            <a:r>
-              <a:rPr lang="en-US" dirty="0"/>
-              <a:t>” </a:t>
-            </a:r>
-          </a:p>
-          <a:p>
-            <a:r>
-              <a:rPr lang="en-US" dirty="0"/>
-              <a:t>Type function helps us determine what is the type of the variable it is. </a:t>
-            </a:r>
-          </a:p>
-          <a:p>
-            <a:endParaRPr lang="en-US" dirty="0"/>
-          </a:p>
-          <a:p>
-            <a:endParaRPr lang="en-US" dirty="0"/>
-          </a:p>
-          <a:p>
-            <a:endParaRPr lang="en-US" dirty="0"/>
-          </a:p>
-        </p:txBody>
-      </p:sp>
-    </p:spTree>
-    <p:extLst>
-      <p:ext uri="{BB962C8B-B14F-4D97-AF65-F5344CB8AC3E}">
-        <p14:creationId xmlns:p14="http://schemas.microsoft.com/office/powerpoint/2010/main" val="1284129504"/>
-      </p:ext>
-    </p:extLst>
-  </p:cSld>
-  <p:clrMapOvr>
-    <a:masterClrMapping/>
-  </p:clrMapOvr>
-</p:sld>
-</file>
-
-<file path=ppt/slides/slide8.xml><?xml version="1.0" encoding="utf-8"?>
-<p:sld xmlns:a="http://schemas.openxmlformats.org/drawingml/2006/main" xmlns:r="http://schemas.openxmlformats.org/officeDocument/2006/relationships" xmlns:p="http://schemas.openxmlformats.org/presentationml/2006/main">
-  <p:cSld>
-    <p:spTree>
-      <p:nvGrpSpPr>
-        <p:cNvPr id="1" name=""/>
-        <p:cNvGrpSpPr/>
-        <p:nvPr/>
-      </p:nvGrpSpPr>
-      <p:grpSpPr>
-        <a:xfrm>
-          <a:off x="0" y="0"/>
-          <a:ext cx="0" cy="0"/>
-          <a:chOff x="0" y="0"/>
-          <a:chExt cx="0" cy="0"/>
-        </a:xfrm>
-      </p:grpSpPr>
-      <p:sp>
-        <p:nvSpPr>
-          <p:cNvPr id="2" name="Title 1">
-            <a:extLst>
-              <a:ext uri="{FF2B5EF4-FFF2-40B4-BE49-F238E27FC236}">
-                <a16:creationId xmlns:a16="http://schemas.microsoft.com/office/drawing/2014/main" id="{49B61C72-FA3B-48EA-861D-46B179609540}"/>
-              </a:ext>
-            </a:extLst>
-          </p:cNvPr>
-          <p:cNvSpPr>
-            <a:spLocks noGrp="1"/>
-          </p:cNvSpPr>
-          <p:nvPr>
-            <p:ph type="title"/>
-          </p:nvPr>
-        </p:nvSpPr>
-        <p:spPr/>
-        <p:txBody>
-          <a:bodyPr/>
-          <a:lstStyle/>
-          <a:p>
-            <a:r>
-              <a:rPr lang="en-US" dirty="0" err="1"/>
-              <a:t>Concat</a:t>
-            </a:r>
-            <a:r>
-              <a:rPr lang="en-US" dirty="0"/>
-              <a:t> two strings </a:t>
-            </a:r>
-          </a:p>
-        </p:txBody>
-      </p:sp>
-      <p:sp>
-        <p:nvSpPr>
-          <p:cNvPr id="3" name="Content Placeholder 2">
-            <a:extLst>
-              <a:ext uri="{FF2B5EF4-FFF2-40B4-BE49-F238E27FC236}">
-                <a16:creationId xmlns:a16="http://schemas.microsoft.com/office/drawing/2014/main" id="{B802B224-EAED-4C5C-B364-1C2EE94BA9BE}"/>
-              </a:ext>
-            </a:extLst>
-          </p:cNvPr>
-          <p:cNvSpPr>
-            <a:spLocks noGrp="1"/>
-          </p:cNvSpPr>
-          <p:nvPr>
-            <p:ph idx="1"/>
-          </p:nvPr>
-        </p:nvSpPr>
-        <p:spPr/>
-        <p:txBody>
-          <a:bodyPr/>
-          <a:lstStyle/>
-          <a:p>
-            <a:r>
-              <a:rPr lang="en-US" dirty="0"/>
-              <a:t>a = “my name” </a:t>
-            </a:r>
-          </a:p>
-          <a:p>
-            <a:r>
-              <a:rPr lang="en-US" dirty="0"/>
-              <a:t>b = “</a:t>
-            </a:r>
-            <a:r>
-              <a:rPr lang="en-US" dirty="0" err="1"/>
-              <a:t>xyz</a:t>
-            </a:r>
-            <a:r>
-              <a:rPr lang="en-US" dirty="0"/>
-              <a:t>” </a:t>
-            </a:r>
-          </a:p>
-          <a:p>
-            <a:r>
-              <a:rPr lang="en-US" dirty="0"/>
-              <a:t>c = a + b</a:t>
-            </a:r>
-          </a:p>
-          <a:p>
-            <a:r>
-              <a:rPr lang="en-US" dirty="0"/>
-              <a:t>Print(c) </a:t>
-            </a:r>
-          </a:p>
-          <a:p>
-            <a:endParaRPr lang="en-US" dirty="0"/>
-          </a:p>
-        </p:txBody>
-      </p:sp>
-    </p:spTree>
-    <p:extLst>
-      <p:ext uri="{BB962C8B-B14F-4D97-AF65-F5344CB8AC3E}">
-        <p14:creationId xmlns:p14="http://schemas.microsoft.com/office/powerpoint/2010/main" val="2001054306"/>
-      </p:ext>
-    </p:extLst>
-  </p:cSld>
-  <p:clrMapOvr>
-    <a:masterClrMapping/>
-  </p:clrMapOvr>
-</p:sld>
-</file>
-
-<file path=ppt/slides/slide9.xml><?xml version="1.0" encoding="utf-8"?>
-<p:sld xmlns:a="http://schemas.openxmlformats.org/drawingml/2006/main" xmlns:r="http://schemas.openxmlformats.org/officeDocument/2006/relationships" xmlns:p="http://schemas.openxmlformats.org/presentationml/2006/main">
-  <p:cSld>
-    <p:spTree>
-      <p:nvGrpSpPr>
-        <p:cNvPr id="1" name=""/>
-        <p:cNvGrpSpPr/>
-        <p:nvPr/>
-      </p:nvGrpSpPr>
-      <p:grpSpPr>
-        <a:xfrm>
-          <a:off x="0" y="0"/>
-          <a:ext cx="0" cy="0"/>
-          <a:chOff x="0" y="0"/>
-          <a:chExt cx="0" cy="0"/>
-        </a:xfrm>
-      </p:grpSpPr>
-      <p:sp>
-        <p:nvSpPr>
-          <p:cNvPr id="2" name="Title 1">
-            <a:extLst>
-              <a:ext uri="{FF2B5EF4-FFF2-40B4-BE49-F238E27FC236}">
-                <a16:creationId xmlns:a16="http://schemas.microsoft.com/office/drawing/2014/main" id="{205C3B8C-9D53-454F-B981-097863C227DB}"/>
-              </a:ext>
-            </a:extLst>
-          </p:cNvPr>
-          <p:cNvSpPr>
-            <a:spLocks noGrp="1"/>
-          </p:cNvSpPr>
-          <p:nvPr>
-            <p:ph type="title"/>
-          </p:nvPr>
-        </p:nvSpPr>
-        <p:spPr/>
-        <p:txBody>
-          <a:bodyPr/>
-          <a:lstStyle/>
-          <a:p>
-            <a:r>
-              <a:rPr lang="en-US" dirty="0"/>
-              <a:t>Booleans</a:t>
-            </a:r>
-          </a:p>
-        </p:txBody>
-      </p:sp>
-      <p:sp>
-        <p:nvSpPr>
-          <p:cNvPr id="3" name="Content Placeholder 2">
-            <a:extLst>
-              <a:ext uri="{FF2B5EF4-FFF2-40B4-BE49-F238E27FC236}">
-                <a16:creationId xmlns:a16="http://schemas.microsoft.com/office/drawing/2014/main" id="{1A6E18F8-09FE-4FCF-B718-E1F5A121B8DC}"/>
-              </a:ext>
-            </a:extLst>
-          </p:cNvPr>
-          <p:cNvSpPr>
-            <a:spLocks noGrp="1"/>
-          </p:cNvSpPr>
-          <p:nvPr>
-            <p:ph idx="1"/>
-          </p:nvPr>
-        </p:nvSpPr>
-        <p:spPr/>
-        <p:txBody>
-          <a:bodyPr/>
-          <a:lstStyle/>
-          <a:p>
-            <a:r>
-              <a:rPr lang="en-US" dirty="0"/>
-              <a:t>It can be True or False </a:t>
-            </a:r>
-          </a:p>
-          <a:p>
-            <a:r>
-              <a:rPr lang="en-US" dirty="0"/>
-              <a:t>Keyword bool </a:t>
-            </a:r>
-          </a:p>
-        </p:txBody>
-      </p:sp>
-    </p:spTree>
-    <p:extLst>
-      <p:ext uri="{BB962C8B-B14F-4D97-AF65-F5344CB8AC3E}">
-        <p14:creationId xmlns:p14="http://schemas.microsoft.com/office/powerpoint/2010/main" val="3800990825"/>
       </p:ext>
     </p:extLst>
   </p:cSld>

</xml_diff>